<commit_message>
Updated wireframe diagram and sitemap. Uploaded Ahuti's priorities
</commit_message>
<xml_diff>
--- a/docs/sitemap/Sitemap.pptx
+++ b/docs/sitemap/Sitemap.pptx
@@ -104,6 +104,11 @@
       </a:defRPr>
     </a:lvl9pPr>
   </p:defaultTextStyle>
+  <p:extLst>
+    <p:ext uri="{EFAFB233-063F-42B5-8137-9DF3F51BA10A}">
+      <p15:sldGuideLst xmlns:p15="http://schemas.microsoft.com/office/powerpoint/2012/main"/>
+    </p:ext>
+  </p:extLst>
 </p:presentation>
 </file>
 
@@ -254,7 +259,7 @@
           <a:p>
             <a:fld id="{7CAC5410-DBC2-BC40-9B70-57C2CEA9B6D9}" type="datetimeFigureOut">
               <a:rPr lang="en-US" smtClean="0"/>
-              <a:t>3/24/19</a:t>
+              <a:t>3/25/19</a:t>
             </a:fld>
             <a:endParaRPr lang="en-US"/>
           </a:p>
@@ -452,7 +457,7 @@
           <a:p>
             <a:fld id="{7CAC5410-DBC2-BC40-9B70-57C2CEA9B6D9}" type="datetimeFigureOut">
               <a:rPr lang="en-US" smtClean="0"/>
-              <a:t>3/24/19</a:t>
+              <a:t>3/25/19</a:t>
             </a:fld>
             <a:endParaRPr lang="en-US"/>
           </a:p>
@@ -660,7 +665,7 @@
           <a:p>
             <a:fld id="{7CAC5410-DBC2-BC40-9B70-57C2CEA9B6D9}" type="datetimeFigureOut">
               <a:rPr lang="en-US" smtClean="0"/>
-              <a:t>3/24/19</a:t>
+              <a:t>3/25/19</a:t>
             </a:fld>
             <a:endParaRPr lang="en-US"/>
           </a:p>
@@ -858,7 +863,7 @@
           <a:p>
             <a:fld id="{7CAC5410-DBC2-BC40-9B70-57C2CEA9B6D9}" type="datetimeFigureOut">
               <a:rPr lang="en-US" smtClean="0"/>
-              <a:t>3/24/19</a:t>
+              <a:t>3/25/19</a:t>
             </a:fld>
             <a:endParaRPr lang="en-US"/>
           </a:p>
@@ -1133,7 +1138,7 @@
           <a:p>
             <a:fld id="{7CAC5410-DBC2-BC40-9B70-57C2CEA9B6D9}" type="datetimeFigureOut">
               <a:rPr lang="en-US" smtClean="0"/>
-              <a:t>3/24/19</a:t>
+              <a:t>3/25/19</a:t>
             </a:fld>
             <a:endParaRPr lang="en-US"/>
           </a:p>
@@ -1398,7 +1403,7 @@
           <a:p>
             <a:fld id="{7CAC5410-DBC2-BC40-9B70-57C2CEA9B6D9}" type="datetimeFigureOut">
               <a:rPr lang="en-US" smtClean="0"/>
-              <a:t>3/24/19</a:t>
+              <a:t>3/25/19</a:t>
             </a:fld>
             <a:endParaRPr lang="en-US"/>
           </a:p>
@@ -1810,7 +1815,7 @@
           <a:p>
             <a:fld id="{7CAC5410-DBC2-BC40-9B70-57C2CEA9B6D9}" type="datetimeFigureOut">
               <a:rPr lang="en-US" smtClean="0"/>
-              <a:t>3/24/19</a:t>
+              <a:t>3/25/19</a:t>
             </a:fld>
             <a:endParaRPr lang="en-US"/>
           </a:p>
@@ -1951,7 +1956,7 @@
           <a:p>
             <a:fld id="{7CAC5410-DBC2-BC40-9B70-57C2CEA9B6D9}" type="datetimeFigureOut">
               <a:rPr lang="en-US" smtClean="0"/>
-              <a:t>3/24/19</a:t>
+              <a:t>3/25/19</a:t>
             </a:fld>
             <a:endParaRPr lang="en-US"/>
           </a:p>
@@ -2064,7 +2069,7 @@
           <a:p>
             <a:fld id="{7CAC5410-DBC2-BC40-9B70-57C2CEA9B6D9}" type="datetimeFigureOut">
               <a:rPr lang="en-US" smtClean="0"/>
-              <a:t>3/24/19</a:t>
+              <a:t>3/25/19</a:t>
             </a:fld>
             <a:endParaRPr lang="en-US"/>
           </a:p>
@@ -2375,7 +2380,7 @@
           <a:p>
             <a:fld id="{7CAC5410-DBC2-BC40-9B70-57C2CEA9B6D9}" type="datetimeFigureOut">
               <a:rPr lang="en-US" smtClean="0"/>
-              <a:t>3/24/19</a:t>
+              <a:t>3/25/19</a:t>
             </a:fld>
             <a:endParaRPr lang="en-US"/>
           </a:p>
@@ -2663,7 +2668,7 @@
           <a:p>
             <a:fld id="{7CAC5410-DBC2-BC40-9B70-57C2CEA9B6D9}" type="datetimeFigureOut">
               <a:rPr lang="en-US" smtClean="0"/>
-              <a:t>3/24/19</a:t>
+              <a:t>3/25/19</a:t>
             </a:fld>
             <a:endParaRPr lang="en-US"/>
           </a:p>
@@ -2904,7 +2909,7 @@
           <a:p>
             <a:fld id="{7CAC5410-DBC2-BC40-9B70-57C2CEA9B6D9}" type="datetimeFigureOut">
               <a:rPr lang="en-US" smtClean="0"/>
-              <a:t>3/24/19</a:t>
+              <a:t>3/25/19</a:t>
             </a:fld>
             <a:endParaRPr lang="en-US"/>
           </a:p>
@@ -3433,7 +3438,7 @@
         </p:nvSpPr>
         <p:spPr>
           <a:xfrm>
-            <a:off x="829220" y="1612764"/>
+            <a:off x="908733" y="2593425"/>
             <a:ext cx="1594211" cy="717618"/>
           </a:xfrm>
           <a:prstGeom prst="rect">
@@ -3482,7 +3487,7 @@
         </p:nvSpPr>
         <p:spPr>
           <a:xfrm>
-            <a:off x="3770131" y="1601785"/>
+            <a:off x="3849644" y="2582446"/>
             <a:ext cx="1594211" cy="717618"/>
           </a:xfrm>
           <a:prstGeom prst="rect">
@@ -3531,7 +3536,7 @@
         </p:nvSpPr>
         <p:spPr>
           <a:xfrm>
-            <a:off x="6347145" y="1601786"/>
+            <a:off x="6426658" y="2582447"/>
             <a:ext cx="1594211" cy="717618"/>
           </a:xfrm>
           <a:prstGeom prst="rect">
@@ -3580,7 +3585,7 @@
         </p:nvSpPr>
         <p:spPr>
           <a:xfrm>
-            <a:off x="829219" y="3090152"/>
+            <a:off x="908732" y="4070813"/>
             <a:ext cx="1594211" cy="717618"/>
           </a:xfrm>
           <a:prstGeom prst="rect">
@@ -3629,7 +3634,7 @@
         </p:nvSpPr>
         <p:spPr>
           <a:xfrm>
-            <a:off x="829218" y="4735439"/>
+            <a:off x="908731" y="5716100"/>
             <a:ext cx="1594211" cy="717618"/>
           </a:xfrm>
           <a:prstGeom prst="rect">
@@ -3675,20 +3680,18 @@
           </p:cNvPr>
           <p:cNvCxnSpPr>
             <a:cxnSpLocks/>
-            <a:stCxn id="4" idx="2"/>
+            <a:stCxn id="32" idx="1"/>
             <a:endCxn id="7" idx="0"/>
           </p:cNvCxnSpPr>
           <p:nvPr/>
         </p:nvCxnSpPr>
         <p:spPr>
-          <a:xfrm rot="5400000">
-            <a:off x="3438014" y="-740542"/>
-            <a:ext cx="541619" cy="4164993"/>
-          </a:xfrm>
-          <a:prstGeom prst="bentConnector3">
-            <a:avLst>
-              <a:gd name="adj1" fmla="val 52862"/>
-            </a:avLst>
+          <a:xfrm rot="10800000" flipV="1">
+            <a:off x="1705839" y="1872283"/>
+            <a:ext cx="999908" cy="721141"/>
+          </a:xfrm>
+          <a:prstGeom prst="bentConnector2">
+            <a:avLst/>
           </a:prstGeom>
           <a:ln>
             <a:headEnd type="none"/>
@@ -3724,7 +3727,7 @@
         </p:nvSpPr>
         <p:spPr>
           <a:xfrm>
-            <a:off x="2912180" y="3079735"/>
+            <a:off x="2991693" y="4060396"/>
             <a:ext cx="1594211" cy="717618"/>
           </a:xfrm>
           <a:prstGeom prst="rect">
@@ -3820,7 +3823,7 @@
         </p:nvCxnSpPr>
         <p:spPr>
           <a:xfrm rot="5400000">
-            <a:off x="3758096" y="2270594"/>
+            <a:off x="3837609" y="3251255"/>
             <a:ext cx="760332" cy="857951"/>
           </a:xfrm>
           <a:prstGeom prst="bentConnector3">
@@ -3862,7 +3865,7 @@
         </p:nvSpPr>
         <p:spPr>
           <a:xfrm>
-            <a:off x="4660086" y="3079735"/>
+            <a:off x="4739599" y="4060396"/>
             <a:ext cx="1594211" cy="717618"/>
           </a:xfrm>
           <a:prstGeom prst="rect">
@@ -3915,7 +3918,7 @@
         </p:nvCxnSpPr>
         <p:spPr>
           <a:xfrm rot="16200000" flipH="1">
-            <a:off x="4632048" y="2254591"/>
+            <a:off x="4711561" y="3235252"/>
             <a:ext cx="760332" cy="889955"/>
           </a:xfrm>
           <a:prstGeom prst="bentConnector3">
@@ -3961,7 +3964,7 @@
         </p:nvCxnSpPr>
         <p:spPr>
           <a:xfrm rot="5400000">
-            <a:off x="1246441" y="2710267"/>
+            <a:off x="1325954" y="3690928"/>
             <a:ext cx="759770" cy="1"/>
           </a:xfrm>
           <a:prstGeom prst="bentConnector3">
@@ -4007,7 +4010,7 @@
         </p:nvCxnSpPr>
         <p:spPr>
           <a:xfrm rot="5400000">
-            <a:off x="1162491" y="4271604"/>
+            <a:off x="1242004" y="5252265"/>
             <a:ext cx="927669" cy="1"/>
           </a:xfrm>
           <a:prstGeom prst="bentConnector3">
@@ -4053,8 +4056,241 @@
         </p:nvCxnSpPr>
         <p:spPr>
           <a:xfrm rot="16200000" flipV="1">
-            <a:off x="5530690" y="1355951"/>
+            <a:off x="5610203" y="2336612"/>
             <a:ext cx="770749" cy="2697654"/>
+          </a:xfrm>
+          <a:prstGeom prst="bentConnector3">
+            <a:avLst>
+              <a:gd name="adj1" fmla="val 49999"/>
+            </a:avLst>
+          </a:prstGeom>
+          <a:ln>
+            <a:headEnd type="none"/>
+            <a:tailEnd type="triangle"/>
+          </a:ln>
+        </p:spPr>
+        <p:style>
+          <a:lnRef idx="1">
+            <a:schemeClr val="accent1"/>
+          </a:lnRef>
+          <a:fillRef idx="0">
+            <a:schemeClr val="accent1"/>
+          </a:fillRef>
+          <a:effectRef idx="0">
+            <a:schemeClr val="accent1"/>
+          </a:effectRef>
+          <a:fontRef idx="minor">
+            <a:schemeClr val="tx1"/>
+          </a:fontRef>
+        </p:style>
+      </p:cxnSp>
+      <p:sp>
+        <p:nvSpPr>
+          <p:cNvPr id="85" name="Rectangle 84">
+            <a:extLst>
+              <a:ext uri="{FF2B5EF4-FFF2-40B4-BE49-F238E27FC236}">
+                <a16:creationId xmlns:a16="http://schemas.microsoft.com/office/drawing/2014/main" id="{DF2D1B95-37C2-0944-B5D1-151391C4279A}"/>
+              </a:ext>
+            </a:extLst>
+          </p:cNvPr>
+          <p:cNvSpPr/>
+          <p:nvPr/>
+        </p:nvSpPr>
+        <p:spPr>
+          <a:xfrm>
+            <a:off x="6547298" y="4070813"/>
+            <a:ext cx="1594211" cy="717618"/>
+          </a:xfrm>
+          <a:prstGeom prst="rect">
+            <a:avLst/>
+          </a:prstGeom>
+        </p:spPr>
+        <p:style>
+          <a:lnRef idx="2">
+            <a:schemeClr val="accent1">
+              <a:shade val="50000"/>
+            </a:schemeClr>
+          </a:lnRef>
+          <a:fillRef idx="1">
+            <a:schemeClr val="accent1"/>
+          </a:fillRef>
+          <a:effectRef idx="0">
+            <a:schemeClr val="accent1"/>
+          </a:effectRef>
+          <a:fontRef idx="minor">
+            <a:schemeClr val="lt1"/>
+          </a:fontRef>
+        </p:style>
+        <p:txBody>
+          <a:bodyPr rtlCol="0" anchor="ctr"/>
+          <a:lstStyle/>
+          <a:p>
+            <a:pPr algn="ctr"/>
+            <a:r>
+              <a:rPr lang="en-US" dirty="0"/>
+              <a:t>Edit Item Posted</a:t>
+            </a:r>
+          </a:p>
+        </p:txBody>
+      </p:sp>
+      <p:cxnSp>
+        <p:nvCxnSpPr>
+          <p:cNvPr id="88" name="Elbow Connector 87">
+            <a:extLst>
+              <a:ext uri="{FF2B5EF4-FFF2-40B4-BE49-F238E27FC236}">
+                <a16:creationId xmlns:a16="http://schemas.microsoft.com/office/drawing/2014/main" id="{8DD9FABC-DF0C-654F-9958-0FDAAE222C07}"/>
+              </a:ext>
+            </a:extLst>
+          </p:cNvPr>
+          <p:cNvCxnSpPr>
+            <a:cxnSpLocks/>
+            <a:stCxn id="49" idx="2"/>
+            <a:endCxn id="85" idx="2"/>
+          </p:cNvCxnSpPr>
+          <p:nvPr/>
+        </p:nvCxnSpPr>
+        <p:spPr>
+          <a:xfrm rot="16200000" flipH="1">
+            <a:off x="6435346" y="3879372"/>
+            <a:ext cx="10417" cy="1807699"/>
+          </a:xfrm>
+          <a:prstGeom prst="bentConnector3">
+            <a:avLst>
+              <a:gd name="adj1" fmla="val 2294490"/>
+            </a:avLst>
+          </a:prstGeom>
+          <a:ln>
+            <a:headEnd type="none"/>
+            <a:tailEnd type="triangle"/>
+          </a:ln>
+        </p:spPr>
+        <p:style>
+          <a:lnRef idx="1">
+            <a:schemeClr val="accent1"/>
+          </a:lnRef>
+          <a:fillRef idx="0">
+            <a:schemeClr val="accent1"/>
+          </a:fillRef>
+          <a:effectRef idx="0">
+            <a:schemeClr val="accent1"/>
+          </a:effectRef>
+          <a:fontRef idx="minor">
+            <a:schemeClr val="tx1"/>
+          </a:fontRef>
+        </p:style>
+      </p:cxnSp>
+      <p:cxnSp>
+        <p:nvCxnSpPr>
+          <p:cNvPr id="94" name="Elbow Connector 93">
+            <a:extLst>
+              <a:ext uri="{FF2B5EF4-FFF2-40B4-BE49-F238E27FC236}">
+                <a16:creationId xmlns:a16="http://schemas.microsoft.com/office/drawing/2014/main" id="{F139CECE-94E2-FA49-89FB-06FDB509794A}"/>
+              </a:ext>
+            </a:extLst>
+          </p:cNvPr>
+          <p:cNvCxnSpPr>
+            <a:cxnSpLocks/>
+            <a:stCxn id="6" idx="2"/>
+            <a:endCxn id="7" idx="0"/>
+          </p:cNvCxnSpPr>
+          <p:nvPr/>
+        </p:nvCxnSpPr>
+        <p:spPr>
+          <a:xfrm rot="16200000" flipH="1">
+            <a:off x="706430" y="1594016"/>
+            <a:ext cx="1507368" cy="491450"/>
+          </a:xfrm>
+          <a:prstGeom prst="bentConnector3">
+            <a:avLst>
+              <a:gd name="adj1" fmla="val 51758"/>
+            </a:avLst>
+          </a:prstGeom>
+          <a:ln>
+            <a:headEnd type="none"/>
+            <a:tailEnd type="triangle"/>
+          </a:ln>
+        </p:spPr>
+        <p:style>
+          <a:lnRef idx="1">
+            <a:schemeClr val="accent1"/>
+          </a:lnRef>
+          <a:fillRef idx="0">
+            <a:schemeClr val="accent1"/>
+          </a:fillRef>
+          <a:effectRef idx="0">
+            <a:schemeClr val="accent1"/>
+          </a:effectRef>
+          <a:fontRef idx="minor">
+            <a:schemeClr val="tx1"/>
+          </a:fontRef>
+        </p:style>
+      </p:cxnSp>
+      <p:cxnSp>
+        <p:nvCxnSpPr>
+          <p:cNvPr id="118" name="Elbow Connector 117">
+            <a:extLst>
+              <a:ext uri="{FF2B5EF4-FFF2-40B4-BE49-F238E27FC236}">
+                <a16:creationId xmlns:a16="http://schemas.microsoft.com/office/drawing/2014/main" id="{A7A0F04A-015A-9C4B-8F0D-B72677CD3D91}"/>
+              </a:ext>
+            </a:extLst>
+          </p:cNvPr>
+          <p:cNvCxnSpPr>
+            <a:cxnSpLocks/>
+            <a:stCxn id="7" idx="2"/>
+            <a:endCxn id="8" idx="2"/>
+          </p:cNvCxnSpPr>
+          <p:nvPr/>
+        </p:nvCxnSpPr>
+        <p:spPr>
+          <a:xfrm rot="5400000" flipH="1" flipV="1">
+            <a:off x="3170804" y="1835098"/>
+            <a:ext cx="10979" cy="2940911"/>
+          </a:xfrm>
+          <a:prstGeom prst="bentConnector3">
+            <a:avLst>
+              <a:gd name="adj1" fmla="val -3332171"/>
+            </a:avLst>
+          </a:prstGeom>
+          <a:ln>
+            <a:headEnd type="triangle"/>
+            <a:tailEnd type="triangle"/>
+          </a:ln>
+        </p:spPr>
+        <p:style>
+          <a:lnRef idx="1">
+            <a:schemeClr val="accent1"/>
+          </a:lnRef>
+          <a:fillRef idx="0">
+            <a:schemeClr val="accent1"/>
+          </a:fillRef>
+          <a:effectRef idx="0">
+            <a:schemeClr val="accent1"/>
+          </a:effectRef>
+          <a:fontRef idx="minor">
+            <a:schemeClr val="tx1"/>
+          </a:fontRef>
+        </p:style>
+      </p:cxnSp>
+      <p:cxnSp>
+        <p:nvCxnSpPr>
+          <p:cNvPr id="133" name="Elbow Connector 132">
+            <a:extLst>
+              <a:ext uri="{FF2B5EF4-FFF2-40B4-BE49-F238E27FC236}">
+                <a16:creationId xmlns:a16="http://schemas.microsoft.com/office/drawing/2014/main" id="{F600C681-D4B6-0F40-B18F-EEDEC932D890}"/>
+              </a:ext>
+            </a:extLst>
+          </p:cNvPr>
+          <p:cNvCxnSpPr>
+            <a:cxnSpLocks/>
+            <a:stCxn id="85" idx="0"/>
+            <a:endCxn id="9" idx="2"/>
+          </p:cNvCxnSpPr>
+          <p:nvPr/>
+        </p:nvCxnSpPr>
+        <p:spPr>
+          <a:xfrm rot="16200000" flipV="1">
+            <a:off x="6898710" y="3625119"/>
+            <a:ext cx="770748" cy="120640"/>
           </a:xfrm>
           <a:prstGeom prst="bentConnector3">
             <a:avLst>
@@ -4081,239 +4317,6 @@
           </a:fontRef>
         </p:style>
       </p:cxnSp>
-      <p:sp>
-        <p:nvSpPr>
-          <p:cNvPr id="85" name="Rectangle 84">
-            <a:extLst>
-              <a:ext uri="{FF2B5EF4-FFF2-40B4-BE49-F238E27FC236}">
-                <a16:creationId xmlns:a16="http://schemas.microsoft.com/office/drawing/2014/main" id="{DF2D1B95-37C2-0944-B5D1-151391C4279A}"/>
-              </a:ext>
-            </a:extLst>
-          </p:cNvPr>
-          <p:cNvSpPr/>
-          <p:nvPr/>
-        </p:nvSpPr>
-        <p:spPr>
-          <a:xfrm>
-            <a:off x="6467785" y="3090152"/>
-            <a:ext cx="1594211" cy="717618"/>
-          </a:xfrm>
-          <a:prstGeom prst="rect">
-            <a:avLst/>
-          </a:prstGeom>
-        </p:spPr>
-        <p:style>
-          <a:lnRef idx="2">
-            <a:schemeClr val="accent1">
-              <a:shade val="50000"/>
-            </a:schemeClr>
-          </a:lnRef>
-          <a:fillRef idx="1">
-            <a:schemeClr val="accent1"/>
-          </a:fillRef>
-          <a:effectRef idx="0">
-            <a:schemeClr val="accent1"/>
-          </a:effectRef>
-          <a:fontRef idx="minor">
-            <a:schemeClr val="lt1"/>
-          </a:fontRef>
-        </p:style>
-        <p:txBody>
-          <a:bodyPr rtlCol="0" anchor="ctr"/>
-          <a:lstStyle/>
-          <a:p>
-            <a:pPr algn="ctr"/>
-            <a:r>
-              <a:rPr lang="en-US" dirty="0"/>
-              <a:t>Edit Item Posted</a:t>
-            </a:r>
-          </a:p>
-        </p:txBody>
-      </p:sp>
-      <p:cxnSp>
-        <p:nvCxnSpPr>
-          <p:cNvPr id="88" name="Elbow Connector 87">
-            <a:extLst>
-              <a:ext uri="{FF2B5EF4-FFF2-40B4-BE49-F238E27FC236}">
-                <a16:creationId xmlns:a16="http://schemas.microsoft.com/office/drawing/2014/main" id="{8DD9FABC-DF0C-654F-9958-0FDAAE222C07}"/>
-              </a:ext>
-            </a:extLst>
-          </p:cNvPr>
-          <p:cNvCxnSpPr>
-            <a:cxnSpLocks/>
-            <a:stCxn id="49" idx="2"/>
-            <a:endCxn id="85" idx="2"/>
-          </p:cNvCxnSpPr>
-          <p:nvPr/>
-        </p:nvCxnSpPr>
-        <p:spPr>
-          <a:xfrm rot="16200000" flipH="1">
-            <a:off x="6355833" y="2898711"/>
-            <a:ext cx="10417" cy="1807699"/>
-          </a:xfrm>
-          <a:prstGeom prst="bentConnector3">
-            <a:avLst>
-              <a:gd name="adj1" fmla="val 2294490"/>
-            </a:avLst>
-          </a:prstGeom>
-          <a:ln>
-            <a:headEnd type="none"/>
-            <a:tailEnd type="triangle"/>
-          </a:ln>
-        </p:spPr>
-        <p:style>
-          <a:lnRef idx="1">
-            <a:schemeClr val="accent1"/>
-          </a:lnRef>
-          <a:fillRef idx="0">
-            <a:schemeClr val="accent1"/>
-          </a:fillRef>
-          <a:effectRef idx="0">
-            <a:schemeClr val="accent1"/>
-          </a:effectRef>
-          <a:fontRef idx="minor">
-            <a:schemeClr val="tx1"/>
-          </a:fontRef>
-        </p:style>
-      </p:cxnSp>
-      <p:cxnSp>
-        <p:nvCxnSpPr>
-          <p:cNvPr id="94" name="Elbow Connector 93">
-            <a:extLst>
-              <a:ext uri="{FF2B5EF4-FFF2-40B4-BE49-F238E27FC236}">
-                <a16:creationId xmlns:a16="http://schemas.microsoft.com/office/drawing/2014/main" id="{F139CECE-94E2-FA49-89FB-06FDB509794A}"/>
-              </a:ext>
-            </a:extLst>
-          </p:cNvPr>
-          <p:cNvCxnSpPr>
-            <a:cxnSpLocks/>
-            <a:stCxn id="6" idx="2"/>
-            <a:endCxn id="7" idx="0"/>
-          </p:cNvCxnSpPr>
-          <p:nvPr/>
-        </p:nvCxnSpPr>
-        <p:spPr>
-          <a:xfrm rot="16200000" flipH="1">
-            <a:off x="1157004" y="1143441"/>
-            <a:ext cx="526707" cy="411937"/>
-          </a:xfrm>
-          <a:prstGeom prst="bentConnector3">
-            <a:avLst>
-              <a:gd name="adj1" fmla="val 50000"/>
-            </a:avLst>
-          </a:prstGeom>
-          <a:ln>
-            <a:headEnd type="none"/>
-            <a:tailEnd type="triangle"/>
-          </a:ln>
-        </p:spPr>
-        <p:style>
-          <a:lnRef idx="1">
-            <a:schemeClr val="accent1"/>
-          </a:lnRef>
-          <a:fillRef idx="0">
-            <a:schemeClr val="accent1"/>
-          </a:fillRef>
-          <a:effectRef idx="0">
-            <a:schemeClr val="accent1"/>
-          </a:effectRef>
-          <a:fontRef idx="minor">
-            <a:schemeClr val="tx1"/>
-          </a:fontRef>
-        </p:style>
-      </p:cxnSp>
-      <p:cxnSp>
-        <p:nvCxnSpPr>
-          <p:cNvPr id="118" name="Elbow Connector 117">
-            <a:extLst>
-              <a:ext uri="{FF2B5EF4-FFF2-40B4-BE49-F238E27FC236}">
-                <a16:creationId xmlns:a16="http://schemas.microsoft.com/office/drawing/2014/main" id="{A7A0F04A-015A-9C4B-8F0D-B72677CD3D91}"/>
-              </a:ext>
-            </a:extLst>
-          </p:cNvPr>
-          <p:cNvCxnSpPr>
-            <a:cxnSpLocks/>
-            <a:stCxn id="7" idx="2"/>
-            <a:endCxn id="8" idx="2"/>
-          </p:cNvCxnSpPr>
-          <p:nvPr/>
-        </p:nvCxnSpPr>
-        <p:spPr>
-          <a:xfrm rot="5400000" flipH="1" flipV="1">
-            <a:off x="3091291" y="854437"/>
-            <a:ext cx="10979" cy="2940911"/>
-          </a:xfrm>
-          <a:prstGeom prst="bentConnector3">
-            <a:avLst>
-              <a:gd name="adj1" fmla="val -3211458"/>
-            </a:avLst>
-          </a:prstGeom>
-          <a:ln>
-            <a:headEnd type="triangle"/>
-            <a:tailEnd type="triangle"/>
-          </a:ln>
-        </p:spPr>
-        <p:style>
-          <a:lnRef idx="1">
-            <a:schemeClr val="accent1"/>
-          </a:lnRef>
-          <a:fillRef idx="0">
-            <a:schemeClr val="accent1"/>
-          </a:fillRef>
-          <a:effectRef idx="0">
-            <a:schemeClr val="accent1"/>
-          </a:effectRef>
-          <a:fontRef idx="minor">
-            <a:schemeClr val="tx1"/>
-          </a:fontRef>
-        </p:style>
-      </p:cxnSp>
-      <p:cxnSp>
-        <p:nvCxnSpPr>
-          <p:cNvPr id="133" name="Elbow Connector 132">
-            <a:extLst>
-              <a:ext uri="{FF2B5EF4-FFF2-40B4-BE49-F238E27FC236}">
-                <a16:creationId xmlns:a16="http://schemas.microsoft.com/office/drawing/2014/main" id="{F600C681-D4B6-0F40-B18F-EEDEC932D890}"/>
-              </a:ext>
-            </a:extLst>
-          </p:cNvPr>
-          <p:cNvCxnSpPr>
-            <a:cxnSpLocks/>
-            <a:stCxn id="85" idx="0"/>
-            <a:endCxn id="9" idx="2"/>
-          </p:cNvCxnSpPr>
-          <p:nvPr/>
-        </p:nvCxnSpPr>
-        <p:spPr>
-          <a:xfrm rot="16200000" flipV="1">
-            <a:off x="6819197" y="2644458"/>
-            <a:ext cx="770748" cy="120640"/>
-          </a:xfrm>
-          <a:prstGeom prst="bentConnector3">
-            <a:avLst>
-              <a:gd name="adj1" fmla="val 50000"/>
-            </a:avLst>
-          </a:prstGeom>
-          <a:ln>
-            <a:headEnd type="none"/>
-            <a:tailEnd type="triangle"/>
-          </a:ln>
-        </p:spPr>
-        <p:style>
-          <a:lnRef idx="1">
-            <a:schemeClr val="accent1"/>
-          </a:lnRef>
-          <a:fillRef idx="0">
-            <a:schemeClr val="accent1"/>
-          </a:fillRef>
-          <a:effectRef idx="0">
-            <a:schemeClr val="accent1"/>
-          </a:effectRef>
-          <a:fontRef idx="minor">
-            <a:schemeClr val="tx1"/>
-          </a:fontRef>
-        </p:style>
-      </p:cxnSp>
       <p:cxnSp>
         <p:nvCxnSpPr>
           <p:cNvPr id="145" name="Elbow Connector 144">
@@ -4331,7 +4334,7 @@
         </p:nvCxnSpPr>
         <p:spPr>
           <a:xfrm rot="5400000" flipH="1" flipV="1">
-            <a:off x="3022429" y="2310676"/>
+            <a:off x="3101942" y="3291337"/>
             <a:ext cx="1097784" cy="397620"/>
           </a:xfrm>
           <a:prstGeom prst="bentConnector2">
@@ -4375,7 +4378,7 @@
         </p:nvCxnSpPr>
         <p:spPr>
           <a:xfrm rot="16200000" flipV="1">
-            <a:off x="5091311" y="2233625"/>
+            <a:off x="5170824" y="3214286"/>
             <a:ext cx="1097784" cy="551722"/>
           </a:xfrm>
           <a:prstGeom prst="bentConnector2">
@@ -4420,7 +4423,7 @@
         </p:nvCxnSpPr>
         <p:spPr>
           <a:xfrm flipH="1" flipV="1">
-            <a:off x="4567237" y="1601785"/>
+            <a:off x="4646750" y="2582446"/>
             <a:ext cx="3494759" cy="1847176"/>
           </a:xfrm>
           <a:prstGeom prst="bentConnector4">
@@ -4466,7 +4469,7 @@
         </p:nvCxnSpPr>
         <p:spPr>
           <a:xfrm rot="16200000" flipV="1">
-            <a:off x="916207" y="2715455"/>
+            <a:off x="995720" y="3696116"/>
             <a:ext cx="685843" cy="3"/>
           </a:xfrm>
           <a:prstGeom prst="bentConnector3">
@@ -4512,7 +4515,7 @@
         </p:nvCxnSpPr>
         <p:spPr>
           <a:xfrm rot="5400000">
-            <a:off x="1375827" y="3757869"/>
+            <a:off x="1455340" y="4738530"/>
             <a:ext cx="2383981" cy="288776"/>
           </a:xfrm>
           <a:prstGeom prst="bentConnector2">
@@ -4521,6 +4524,236 @@
           <a:ln>
             <a:headEnd type="triangle"/>
             <a:tailEnd type="none"/>
+          </a:ln>
+        </p:spPr>
+        <p:style>
+          <a:lnRef idx="1">
+            <a:schemeClr val="accent1"/>
+          </a:lnRef>
+          <a:fillRef idx="0">
+            <a:schemeClr val="accent1"/>
+          </a:fillRef>
+          <a:effectRef idx="0">
+            <a:schemeClr val="accent1"/>
+          </a:effectRef>
+          <a:fontRef idx="minor">
+            <a:schemeClr val="tx1"/>
+          </a:fontRef>
+        </p:style>
+      </p:cxnSp>
+      <p:sp>
+        <p:nvSpPr>
+          <p:cNvPr id="32" name="Rectangle 31">
+            <a:extLst>
+              <a:ext uri="{FF2B5EF4-FFF2-40B4-BE49-F238E27FC236}">
+                <a16:creationId xmlns:a16="http://schemas.microsoft.com/office/drawing/2014/main" id="{83D87AB9-8E7F-BB43-AE13-FD91910869FC}"/>
+              </a:ext>
+            </a:extLst>
+          </p:cNvPr>
+          <p:cNvSpPr/>
+          <p:nvPr/>
+        </p:nvSpPr>
+        <p:spPr>
+          <a:xfrm>
+            <a:off x="2705747" y="1513475"/>
+            <a:ext cx="1594211" cy="717618"/>
+          </a:xfrm>
+          <a:prstGeom prst="rect">
+            <a:avLst/>
+          </a:prstGeom>
+        </p:spPr>
+        <p:style>
+          <a:lnRef idx="2">
+            <a:schemeClr val="accent1">
+              <a:shade val="50000"/>
+            </a:schemeClr>
+          </a:lnRef>
+          <a:fillRef idx="1">
+            <a:schemeClr val="accent1"/>
+          </a:fillRef>
+          <a:effectRef idx="0">
+            <a:schemeClr val="accent1"/>
+          </a:effectRef>
+          <a:fontRef idx="minor">
+            <a:schemeClr val="lt1"/>
+          </a:fontRef>
+        </p:style>
+        <p:txBody>
+          <a:bodyPr rtlCol="0" anchor="ctr"/>
+          <a:lstStyle/>
+          <a:p>
+            <a:pPr algn="ctr"/>
+            <a:r>
+              <a:rPr lang="en-US" dirty="0"/>
+              <a:t>Log in</a:t>
+            </a:r>
+          </a:p>
+        </p:txBody>
+      </p:sp>
+      <p:cxnSp>
+        <p:nvCxnSpPr>
+          <p:cNvPr id="33" name="Elbow Connector 32">
+            <a:extLst>
+              <a:ext uri="{FF2B5EF4-FFF2-40B4-BE49-F238E27FC236}">
+                <a16:creationId xmlns:a16="http://schemas.microsoft.com/office/drawing/2014/main" id="{BF13BA93-7DE6-024D-BF4F-70C57E4A4777}"/>
+              </a:ext>
+            </a:extLst>
+          </p:cNvPr>
+          <p:cNvCxnSpPr>
+            <a:cxnSpLocks/>
+            <a:stCxn id="4" idx="2"/>
+            <a:endCxn id="32" idx="3"/>
+          </p:cNvCxnSpPr>
+          <p:nvPr/>
+        </p:nvCxnSpPr>
+        <p:spPr>
+          <a:xfrm rot="5400000">
+            <a:off x="4645070" y="726034"/>
+            <a:ext cx="801139" cy="1491361"/>
+          </a:xfrm>
+          <a:prstGeom prst="bentConnector2">
+            <a:avLst/>
+          </a:prstGeom>
+          <a:ln>
+            <a:headEnd type="none"/>
+            <a:tailEnd type="triangle"/>
+          </a:ln>
+        </p:spPr>
+        <p:style>
+          <a:lnRef idx="1">
+            <a:schemeClr val="accent1"/>
+          </a:lnRef>
+          <a:fillRef idx="0">
+            <a:schemeClr val="accent1"/>
+          </a:fillRef>
+          <a:effectRef idx="0">
+            <a:schemeClr val="accent1"/>
+          </a:effectRef>
+          <a:fontRef idx="minor">
+            <a:schemeClr val="tx1"/>
+          </a:fontRef>
+        </p:style>
+      </p:cxnSp>
+      <p:sp>
+        <p:nvSpPr>
+          <p:cNvPr id="43" name="Rectangle 42">
+            <a:extLst>
+              <a:ext uri="{FF2B5EF4-FFF2-40B4-BE49-F238E27FC236}">
+                <a16:creationId xmlns:a16="http://schemas.microsoft.com/office/drawing/2014/main" id="{3D0B7043-DA54-1D40-8EFE-D77B72F7DFAA}"/>
+              </a:ext>
+            </a:extLst>
+          </p:cNvPr>
+          <p:cNvSpPr/>
+          <p:nvPr/>
+        </p:nvSpPr>
+        <p:spPr>
+          <a:xfrm>
+            <a:off x="7588333" y="351246"/>
+            <a:ext cx="1594211" cy="717618"/>
+          </a:xfrm>
+          <a:prstGeom prst="rect">
+            <a:avLst/>
+          </a:prstGeom>
+        </p:spPr>
+        <p:style>
+          <a:lnRef idx="2">
+            <a:schemeClr val="accent1">
+              <a:shade val="50000"/>
+            </a:schemeClr>
+          </a:lnRef>
+          <a:fillRef idx="1">
+            <a:schemeClr val="accent1"/>
+          </a:fillRef>
+          <a:effectRef idx="0">
+            <a:schemeClr val="accent1"/>
+          </a:effectRef>
+          <a:fontRef idx="minor">
+            <a:schemeClr val="lt1"/>
+          </a:fontRef>
+        </p:style>
+        <p:txBody>
+          <a:bodyPr rtlCol="0" anchor="ctr"/>
+          <a:lstStyle/>
+          <a:p>
+            <a:pPr algn="ctr"/>
+            <a:r>
+              <a:rPr lang="en-US" dirty="0"/>
+              <a:t>Forgot/Reset Password</a:t>
+            </a:r>
+          </a:p>
+        </p:txBody>
+      </p:sp>
+      <p:cxnSp>
+        <p:nvCxnSpPr>
+          <p:cNvPr id="44" name="Elbow Connector 43">
+            <a:extLst>
+              <a:ext uri="{FF2B5EF4-FFF2-40B4-BE49-F238E27FC236}">
+                <a16:creationId xmlns:a16="http://schemas.microsoft.com/office/drawing/2014/main" id="{2E51D4ED-E716-EA4D-81E2-7FAA5BEAC94C}"/>
+              </a:ext>
+            </a:extLst>
+          </p:cNvPr>
+          <p:cNvCxnSpPr>
+            <a:cxnSpLocks/>
+          </p:cNvCxnSpPr>
+          <p:nvPr/>
+        </p:nvCxnSpPr>
+        <p:spPr>
+          <a:xfrm flipV="1">
+            <a:off x="6588424" y="727248"/>
+            <a:ext cx="999909" cy="2281"/>
+          </a:xfrm>
+          <a:prstGeom prst="bentConnector3">
+            <a:avLst>
+              <a:gd name="adj1" fmla="val 50000"/>
+            </a:avLst>
+          </a:prstGeom>
+          <a:ln>
+            <a:headEnd type="none"/>
+            <a:tailEnd type="triangle"/>
+          </a:ln>
+        </p:spPr>
+        <p:style>
+          <a:lnRef idx="1">
+            <a:schemeClr val="accent1"/>
+          </a:lnRef>
+          <a:fillRef idx="0">
+            <a:schemeClr val="accent1"/>
+          </a:fillRef>
+          <a:effectRef idx="0">
+            <a:schemeClr val="accent1"/>
+          </a:effectRef>
+          <a:fontRef idx="minor">
+            <a:schemeClr val="tx1"/>
+          </a:fontRef>
+        </p:style>
+      </p:cxnSp>
+      <p:cxnSp>
+        <p:nvCxnSpPr>
+          <p:cNvPr id="47" name="Elbow Connector 46">
+            <a:extLst>
+              <a:ext uri="{FF2B5EF4-FFF2-40B4-BE49-F238E27FC236}">
+                <a16:creationId xmlns:a16="http://schemas.microsoft.com/office/drawing/2014/main" id="{DD0F10BF-3143-A04C-BDD9-0A3861074871}"/>
+              </a:ext>
+            </a:extLst>
+          </p:cNvPr>
+          <p:cNvCxnSpPr>
+            <a:cxnSpLocks/>
+            <a:stCxn id="43" idx="2"/>
+            <a:endCxn id="32" idx="3"/>
+          </p:cNvCxnSpPr>
+          <p:nvPr/>
+        </p:nvCxnSpPr>
+        <p:spPr>
+          <a:xfrm rot="5400000">
+            <a:off x="5940989" y="-572166"/>
+            <a:ext cx="803420" cy="4085481"/>
+          </a:xfrm>
+          <a:prstGeom prst="bentConnector2">
+            <a:avLst/>
+          </a:prstGeom>
+          <a:ln>
+            <a:headEnd type="none"/>
+            <a:tailEnd type="triangle"/>
           </a:ln>
         </p:spPr>
         <p:style>

</xml_diff>